<commit_message>
Updated Lecture 2 - presentation.
</commit_message>
<xml_diff>
--- a/02-JAVA-Basics.pptx
+++ b/02-JAVA-Basics.pptx
@@ -4476,7 +4476,7 @@
                   </a:schemeClr>
                 </a:solidFill>
               </a:rPr>
-              <a:t>Всички стойности примитивни типове имат своето представяне като референтен тип</a:t>
+              <a:t>Всички стойностни примитивни типове имат своето представяне като референтен тип</a:t>
             </a:r>
           </a:p>
           <a:p>
@@ -5381,7 +5381,7 @@
                   </a:schemeClr>
                 </a:solidFill>
               </a:rPr>
-              <a:t>Информацията която се намира в паметта  на компютъра се съхранява в променливи</a:t>
+              <a:t>Информацията, която се намира в паметта  на компютъра, се съхранява в променливи</a:t>
             </a:r>
             <a:endParaRPr lang="en-US" dirty="0" smtClean="0">
               <a:solidFill>
@@ -6099,7 +6099,7 @@
                   </a:schemeClr>
                 </a:solidFill>
               </a:rPr>
-              <a:t>Извършват с върху </a:t>
+              <a:t>Извършват се върху </a:t>
             </a:r>
             <a:r>
               <a:rPr lang="en-US" sz="2800" dirty="0" err="1" smtClean="0">
@@ -7329,17 +7329,17 @@
               <a:t> на </a:t>
             </a:r>
             <a:r>
-              <a:rPr lang="ru-RU" sz="2000" dirty="0" err="1">
-                <a:solidFill>
-                  <a:schemeClr val="bg1">
-                    <a:lumMod val="95000"/>
-                  </a:schemeClr>
-                </a:solidFill>
-              </a:rPr>
-              <a:t>дадния</a:t>
-            </a:r>
-            <a:r>
-              <a:rPr lang="ru-RU" sz="2000" dirty="0">
+              <a:rPr lang="ru-RU" sz="2000" dirty="0" err="1" smtClean="0">
+                <a:solidFill>
+                  <a:schemeClr val="bg1">
+                    <a:lumMod val="95000"/>
+                  </a:schemeClr>
+                </a:solidFill>
+              </a:rPr>
+              <a:t>дадения</a:t>
+            </a:r>
+            <a:r>
+              <a:rPr lang="ru-RU" sz="2000" dirty="0" smtClean="0">
                 <a:solidFill>
                   <a:schemeClr val="bg1">
                     <a:lumMod val="95000"/>
@@ -7492,14 +7492,14 @@
               <a:t> </a:t>
             </a:r>
             <a:r>
-              <a:rPr lang="ru-RU" sz="2000" dirty="0" err="1">
-                <a:solidFill>
-                  <a:schemeClr val="bg1">
-                    <a:lumMod val="95000"/>
-                  </a:schemeClr>
-                </a:solidFill>
-              </a:rPr>
-              <a:t>съответно</a:t>
+              <a:rPr lang="ru-RU" sz="2000" dirty="0" smtClean="0">
+                <a:solidFill>
+                  <a:schemeClr val="bg1">
+                    <a:lumMod val="95000"/>
+                  </a:schemeClr>
+                </a:solidFill>
+              </a:rPr>
+              <a:t>1 </a:t>
             </a:r>
             <a:r>
               <a:rPr lang="ru-RU" sz="2000" dirty="0">
@@ -7509,7 +7509,7 @@
                   </a:schemeClr>
                 </a:solidFill>
               </a:rPr>
-              <a:t> 1 и 3. </a:t>
+              <a:t>и 3. </a:t>
             </a:r>
             <a:r>
               <a:rPr lang="ru-RU" sz="2000" dirty="0" err="1">
@@ -8125,7 +8125,7 @@
                   </a:schemeClr>
                 </a:solidFill>
               </a:rPr>
-              <a:t>“I will read  </a:t>
+              <a:t>“I will read the “Harry Potter” </a:t>
             </a:r>
             <a:r>
               <a:rPr lang="en-US" sz="2000" smtClean="0">
@@ -8135,7 +8135,7 @@
                   </a:schemeClr>
                 </a:solidFill>
               </a:rPr>
-              <a:t>“Harry Potter” book.” </a:t>
+              <a:t>book collection.” </a:t>
             </a:r>
             <a:endParaRPr lang="bg-BG" sz="2000" dirty="0" smtClean="0">
               <a:solidFill>
@@ -8998,7 +8998,7 @@
                   </a:schemeClr>
                 </a:solidFill>
               </a:rPr>
-              <a:t>Променливата е контейнер на информация която може да сменя стойността си</a:t>
+              <a:t>Променливата е контейнер на информация, която може да сменя стойността си</a:t>
             </a:r>
             <a:endParaRPr lang="en-US" dirty="0" smtClean="0">
               <a:solidFill>

</xml_diff>

<commit_message>
Updated Lecture 2 and 3 plus added Lecture 4 and samples.
</commit_message>
<xml_diff>
--- a/02-JAVA-Basics.pptx
+++ b/02-JAVA-Basics.pptx
@@ -332,7 +332,7 @@
           <a:p>
             <a:fld id="{3EA744D9-3FBE-48D8-BF2A-85DF203E4D20}" type="datetimeFigureOut">
               <a:rPr lang="bg-BG" smtClean="0"/>
-              <a:t>21.11.2015 г.</a:t>
+              <a:t>28.11.2015 г.</a:t>
             </a:fld>
             <a:endParaRPr lang="bg-BG"/>
           </a:p>
@@ -502,7 +502,7 @@
           <a:p>
             <a:fld id="{3EA744D9-3FBE-48D8-BF2A-85DF203E4D20}" type="datetimeFigureOut">
               <a:rPr lang="bg-BG" smtClean="0"/>
-              <a:t>21.11.2015 г.</a:t>
+              <a:t>28.11.2015 г.</a:t>
             </a:fld>
             <a:endParaRPr lang="bg-BG"/>
           </a:p>
@@ -682,7 +682,7 @@
           <a:p>
             <a:fld id="{3EA744D9-3FBE-48D8-BF2A-85DF203E4D20}" type="datetimeFigureOut">
               <a:rPr lang="bg-BG" smtClean="0"/>
-              <a:t>21.11.2015 г.</a:t>
+              <a:t>28.11.2015 г.</a:t>
             </a:fld>
             <a:endParaRPr lang="bg-BG"/>
           </a:p>
@@ -852,7 +852,7 @@
           <a:p>
             <a:fld id="{3EA744D9-3FBE-48D8-BF2A-85DF203E4D20}" type="datetimeFigureOut">
               <a:rPr lang="bg-BG" smtClean="0"/>
-              <a:t>21.11.2015 г.</a:t>
+              <a:t>28.11.2015 г.</a:t>
             </a:fld>
             <a:endParaRPr lang="bg-BG"/>
           </a:p>
@@ -1098,7 +1098,7 @@
           <a:p>
             <a:fld id="{3EA744D9-3FBE-48D8-BF2A-85DF203E4D20}" type="datetimeFigureOut">
               <a:rPr lang="bg-BG" smtClean="0"/>
-              <a:t>21.11.2015 г.</a:t>
+              <a:t>28.11.2015 г.</a:t>
             </a:fld>
             <a:endParaRPr lang="bg-BG"/>
           </a:p>
@@ -1386,7 +1386,7 @@
           <a:p>
             <a:fld id="{3EA744D9-3FBE-48D8-BF2A-85DF203E4D20}" type="datetimeFigureOut">
               <a:rPr lang="bg-BG" smtClean="0"/>
-              <a:t>21.11.2015 г.</a:t>
+              <a:t>28.11.2015 г.</a:t>
             </a:fld>
             <a:endParaRPr lang="bg-BG"/>
           </a:p>
@@ -1808,7 +1808,7 @@
           <a:p>
             <a:fld id="{3EA744D9-3FBE-48D8-BF2A-85DF203E4D20}" type="datetimeFigureOut">
               <a:rPr lang="bg-BG" smtClean="0"/>
-              <a:t>21.11.2015 г.</a:t>
+              <a:t>28.11.2015 г.</a:t>
             </a:fld>
             <a:endParaRPr lang="bg-BG"/>
           </a:p>
@@ -1926,7 +1926,7 @@
           <a:p>
             <a:fld id="{3EA744D9-3FBE-48D8-BF2A-85DF203E4D20}" type="datetimeFigureOut">
               <a:rPr lang="bg-BG" smtClean="0"/>
-              <a:t>21.11.2015 г.</a:t>
+              <a:t>28.11.2015 г.</a:t>
             </a:fld>
             <a:endParaRPr lang="bg-BG"/>
           </a:p>
@@ -2021,7 +2021,7 @@
           <a:p>
             <a:fld id="{3EA744D9-3FBE-48D8-BF2A-85DF203E4D20}" type="datetimeFigureOut">
               <a:rPr lang="bg-BG" smtClean="0"/>
-              <a:t>21.11.2015 г.</a:t>
+              <a:t>28.11.2015 г.</a:t>
             </a:fld>
             <a:endParaRPr lang="bg-BG"/>
           </a:p>
@@ -2298,7 +2298,7 @@
           <a:p>
             <a:fld id="{3EA744D9-3FBE-48D8-BF2A-85DF203E4D20}" type="datetimeFigureOut">
               <a:rPr lang="bg-BG" smtClean="0"/>
-              <a:t>21.11.2015 г.</a:t>
+              <a:t>28.11.2015 г.</a:t>
             </a:fld>
             <a:endParaRPr lang="bg-BG"/>
           </a:p>
@@ -2551,7 +2551,7 @@
           <a:p>
             <a:fld id="{3EA744D9-3FBE-48D8-BF2A-85DF203E4D20}" type="datetimeFigureOut">
               <a:rPr lang="bg-BG" smtClean="0"/>
-              <a:t>21.11.2015 г.</a:t>
+              <a:t>28.11.2015 г.</a:t>
             </a:fld>
             <a:endParaRPr lang="bg-BG"/>
           </a:p>
@@ -2773,7 +2773,7 @@
           <a:p>
             <a:fld id="{3EA744D9-3FBE-48D8-BF2A-85DF203E4D20}" type="datetimeFigureOut">
               <a:rPr lang="bg-BG" smtClean="0"/>
-              <a:t>21.11.2015 г.</a:t>
+              <a:t>28.11.2015 г.</a:t>
             </a:fld>
             <a:endParaRPr lang="bg-BG"/>
           </a:p>
@@ -7515,13 +7515,13 @@
         </p:spPr>
         <p:txBody>
           <a:bodyPr>
-            <a:normAutofit/>
+            <a:normAutofit lnSpcReduction="10000"/>
           </a:bodyPr>
           <a:lstStyle/>
           <a:p>
-            <a:pPr>
-              <a:buFont typeface="Wingdings" panose="05000000000000000000" pitchFamily="2" charset="2"/>
-              <a:buChar char="§"/>
+            <a:pPr marL="457200" indent="-457200">
+              <a:buFont typeface="+mj-lt"/>
+              <a:buAutoNum type="arabicParenR"/>
             </a:pPr>
             <a:r>
               <a:rPr lang="ru-RU" sz="2000" dirty="0" err="1">
@@ -7782,9 +7782,9 @@
             </a:endParaRPr>
           </a:p>
           <a:p>
-            <a:pPr>
-              <a:buFont typeface="Wingdings" panose="05000000000000000000" pitchFamily="2" charset="2"/>
-              <a:buChar char="§"/>
+            <a:pPr marL="457200" indent="-457200">
+              <a:buFont typeface="+mj-lt"/>
+              <a:buAutoNum type="arabicParenR"/>
             </a:pPr>
             <a:r>
               <a:rPr lang="ru-RU" sz="2000" dirty="0" err="1">
@@ -8005,9 +8005,9 @@
             </a:endParaRPr>
           </a:p>
           <a:p>
-            <a:pPr>
-              <a:buFont typeface="Wingdings" panose="05000000000000000000" pitchFamily="2" charset="2"/>
-              <a:buChar char="§"/>
+            <a:pPr marL="457200" indent="-457200">
+              <a:buFont typeface="+mj-lt"/>
+              <a:buAutoNum type="arabicParenR"/>
             </a:pPr>
             <a:r>
               <a:rPr lang="ru-RU" sz="2000" dirty="0">
@@ -8488,9 +8488,9 @@
             </a:endParaRPr>
           </a:p>
           <a:p>
-            <a:pPr>
-              <a:buFont typeface="Wingdings" panose="05000000000000000000" pitchFamily="2" charset="2"/>
-              <a:buChar char="§"/>
+            <a:pPr marL="457200" indent="-457200">
+              <a:buFont typeface="+mj-lt"/>
+              <a:buAutoNum type="arabicParenR"/>
             </a:pPr>
             <a:r>
               <a:rPr lang="bg-BG" sz="2000" dirty="0" smtClean="0">
@@ -8638,9 +8638,9 @@
           </a:bodyPr>
           <a:lstStyle/>
           <a:p>
-            <a:pPr>
-              <a:buFont typeface="Wingdings" panose="05000000000000000000" pitchFamily="2" charset="2"/>
-              <a:buChar char="§"/>
+            <a:pPr marL="457200" indent="-457200">
+              <a:buFont typeface="+mj-lt"/>
+              <a:buAutoNum type="arabicParenR" startAt="5"/>
             </a:pPr>
             <a:r>
               <a:rPr lang="ru-RU" sz="2000" dirty="0">
@@ -8794,9 +8794,9 @@
             </a:r>
           </a:p>
           <a:p>
-            <a:pPr>
-              <a:buFont typeface="Wingdings" panose="05000000000000000000" pitchFamily="2" charset="2"/>
-              <a:buChar char="§"/>
+            <a:pPr marL="457200" indent="-457200">
+              <a:buFont typeface="+mj-lt"/>
+              <a:buAutoNum type="arabicParenR" startAt="5"/>
             </a:pPr>
             <a:r>
               <a:rPr lang="ru-RU" sz="2000" dirty="0">
@@ -9017,9 +9017,9 @@
             </a:endParaRPr>
           </a:p>
           <a:p>
-            <a:pPr>
-              <a:buFont typeface="Wingdings" panose="05000000000000000000" pitchFamily="2" charset="2"/>
-              <a:buChar char="§"/>
+            <a:pPr marL="457200" indent="-457200">
+              <a:buFont typeface="+mj-lt"/>
+              <a:buAutoNum type="arabicParenR" startAt="5"/>
             </a:pPr>
             <a:r>
               <a:rPr lang="ru-RU" sz="2000" dirty="0">
@@ -9153,9 +9153,9 @@
             </a:r>
           </a:p>
           <a:p>
-            <a:pPr>
-              <a:buFont typeface="Wingdings" panose="05000000000000000000" pitchFamily="2" charset="2"/>
-              <a:buChar char="§"/>
+            <a:pPr marL="457200" indent="-457200">
+              <a:buFont typeface="+mj-lt"/>
+              <a:buAutoNum type="arabicParenR" startAt="5"/>
             </a:pPr>
             <a:r>
               <a:rPr lang="ru-RU" sz="2000" dirty="0">
@@ -9276,9 +9276,9 @@
             </a:endParaRPr>
           </a:p>
           <a:p>
-            <a:pPr>
-              <a:buFont typeface="Wingdings" panose="05000000000000000000" pitchFamily="2" charset="2"/>
-              <a:buChar char="§"/>
+            <a:pPr marL="457200" indent="-457200">
+              <a:buFont typeface="+mj-lt"/>
+              <a:buAutoNum type="arabicParenR" startAt="5"/>
             </a:pPr>
             <a:r>
               <a:rPr lang="ru-RU" sz="2000" dirty="0">
@@ -9432,9 +9432,9 @@
             </a:r>
           </a:p>
           <a:p>
-            <a:pPr>
-              <a:buFont typeface="Wingdings" panose="05000000000000000000" pitchFamily="2" charset="2"/>
-              <a:buChar char="§"/>
+            <a:pPr marL="457200" indent="-457200">
+              <a:buFont typeface="+mj-lt"/>
+              <a:buAutoNum type="arabicParenR" startAt="5"/>
             </a:pPr>
             <a:r>
               <a:rPr lang="ru-RU" sz="2000" dirty="0" err="1" smtClean="0">
@@ -9678,9 +9678,9 @@
             </a:r>
           </a:p>
           <a:p>
-            <a:pPr>
-              <a:buFont typeface="Wingdings" panose="05000000000000000000" pitchFamily="2" charset="2"/>
-              <a:buChar char="§"/>
+            <a:pPr marL="457200" indent="-457200">
+              <a:buFont typeface="+mj-lt"/>
+              <a:buAutoNum type="arabicParenR" startAt="5"/>
             </a:pPr>
             <a:endParaRPr lang="bg-BG" sz="2000" dirty="0" smtClean="0">
               <a:solidFill>

</xml_diff>